<commit_message>
Updating References and readability improvements
</commit_message>
<xml_diff>
--- a/docs/Study Content/DataScience/assets/DS1-AssesmentPoster_Template_StudentVersion.pptx
+++ b/docs/Study Content/DataScience/assets/DS1-AssesmentPoster_Template_StudentVersion.pptx
@@ -315,7 +315,7 @@
               <a:pPr>
                 <a:defRPr/>
               </a:pPr>
-              <a:t>08/09/2021</a:t>
+              <a:t>13/09/2021</a:t>
             </a:fld>
             <a:endParaRPr lang="fr-FR"/>
           </a:p>
@@ -1501,7 +1501,7 @@
               <a:pPr>
                 <a:defRPr/>
               </a:pPr>
-              <a:t>9/8/2021</a:t>
+              <a:t>9/13/2021</a:t>
             </a:fld>
             <a:endParaRPr lang="en-US"/>
           </a:p>
@@ -1678,7 +1678,7 @@
               <a:pPr>
                 <a:defRPr/>
               </a:pPr>
-              <a:t>9/8/2021</a:t>
+              <a:t>9/13/2021</a:t>
             </a:fld>
             <a:endParaRPr lang="en-US"/>
           </a:p>
@@ -1862,7 +1862,7 @@
               <a:pPr>
                 <a:defRPr/>
               </a:pPr>
-              <a:t>9/8/2021</a:t>
+              <a:t>9/13/2021</a:t>
             </a:fld>
             <a:endParaRPr lang="en-US"/>
           </a:p>
@@ -2036,7 +2036,7 @@
               <a:pPr>
                 <a:defRPr/>
               </a:pPr>
-              <a:t>9/8/2021</a:t>
+              <a:t>9/13/2021</a:t>
             </a:fld>
             <a:endParaRPr lang="en-US"/>
           </a:p>
@@ -2287,7 +2287,7 @@
               <a:pPr>
                 <a:defRPr/>
               </a:pPr>
-              <a:t>9/8/2021</a:t>
+              <a:t>9/13/2021</a:t>
             </a:fld>
             <a:endParaRPr lang="en-US"/>
           </a:p>
@@ -2578,7 +2578,7 @@
               <a:pPr>
                 <a:defRPr/>
               </a:pPr>
-              <a:t>9/8/2021</a:t>
+              <a:t>9/13/2021</a:t>
             </a:fld>
             <a:endParaRPr lang="en-US"/>
           </a:p>
@@ -3003,7 +3003,7 @@
               <a:pPr>
                 <a:defRPr/>
               </a:pPr>
-              <a:t>9/8/2021</a:t>
+              <a:t>9/13/2021</a:t>
             </a:fld>
             <a:endParaRPr lang="en-US"/>
           </a:p>
@@ -3126,7 +3126,7 @@
               <a:pPr>
                 <a:defRPr/>
               </a:pPr>
-              <a:t>9/8/2021</a:t>
+              <a:t>9/13/2021</a:t>
             </a:fld>
             <a:endParaRPr lang="en-US"/>
           </a:p>
@@ -3227,7 +3227,7 @@
               <a:pPr>
                 <a:defRPr/>
               </a:pPr>
-              <a:t>9/8/2021</a:t>
+              <a:t>9/13/2021</a:t>
             </a:fld>
             <a:endParaRPr lang="en-US"/>
           </a:p>
@@ -3508,7 +3508,7 @@
               <a:pPr>
                 <a:defRPr/>
               </a:pPr>
-              <a:t>9/8/2021</a:t>
+              <a:t>9/13/2021</a:t>
             </a:fld>
             <a:endParaRPr lang="en-US"/>
           </a:p>
@@ -3772,7 +3772,7 @@
               <a:pPr>
                 <a:defRPr/>
               </a:pPr>
-              <a:t>9/8/2021</a:t>
+              <a:t>9/13/2021</a:t>
             </a:fld>
             <a:endParaRPr lang="en-US"/>
           </a:p>
@@ -4117,7 +4117,7 @@
               <a:pPr>
                 <a:defRPr/>
               </a:pPr>
-              <a:t>9/8/2021</a:t>
+              <a:t>9/13/2021</a:t>
             </a:fld>
             <a:endParaRPr lang="en-US"/>
           </a:p>
@@ -4970,7 +4970,7 @@
               <a:buNone/>
             </a:pPr>
             <a:r>
-              <a:rPr lang="en-NL" altLang="fr-FR" sz="6600">
+              <a:rPr lang="en-NL" altLang="fr-FR" sz="6600" dirty="0">
                 <a:solidFill>
                   <a:srgbClr val="495B64"/>
                 </a:solidFill>
@@ -4979,7 +4979,7 @@
               <a:t>BREDA UNIVERSITY OF APPLIED SCIENCES</a:t>
             </a:r>
             <a:r>
-              <a:rPr lang="fr-FR" altLang="fr-FR" sz="6600">
+              <a:rPr lang="fr-FR" altLang="fr-FR" sz="6600" dirty="0">
                 <a:solidFill>
                   <a:srgbClr val="495B64"/>
                 </a:solidFill>
@@ -4987,7 +4987,7 @@
               </a:rPr>
               <a:t>, </a:t>
             </a:r>
-            <a:endParaRPr lang="en-NL" altLang="fr-FR" sz="6600">
+            <a:endParaRPr lang="en-NL" altLang="fr-FR" sz="6600" dirty="0">
               <a:solidFill>
                 <a:srgbClr val="495B64"/>
               </a:solidFill>
@@ -5003,15 +5003,15 @@
               <a:buNone/>
             </a:pPr>
             <a:r>
-              <a:rPr lang="en-NL" altLang="fr-FR" sz="6600">
+              <a:rPr lang="en-NL" altLang="fr-FR" sz="6600" dirty="0">
                 <a:solidFill>
                   <a:srgbClr val="495B64"/>
                 </a:solidFill>
                 <a:latin typeface="Futura-CondensedLight" pitchFamily="34" charset="0"/>
               </a:rPr>
-              <a:t>DEPARTMENT OF ARTIFICIAL INTELLIGENCE AND DATA MANAGEMENT</a:t>
+              <a:t>Applied Data Science and Artificial Intelligence</a:t>
             </a:r>
-            <a:endParaRPr lang="fr-FR" altLang="fr-FR" sz="6600">
+            <a:endParaRPr lang="fr-FR" altLang="fr-FR" sz="6600" dirty="0">
               <a:solidFill>
                 <a:srgbClr val="495B64"/>
               </a:solidFill>
@@ -14397,41 +14397,6 @@
           </a:extLst>
         </p:spPr>
       </p:pic>
-      <p:pic>
-        <p:nvPicPr>
-          <p:cNvPr id="5" name="Picture 4">
-            <a:extLst>
-              <a:ext uri="{FF2B5EF4-FFF2-40B4-BE49-F238E27FC236}">
-                <a16:creationId xmlns:a16="http://schemas.microsoft.com/office/drawing/2014/main" id="{3AD620C9-CE64-4477-90E0-FE57765C563A}"/>
-              </a:ext>
-            </a:extLst>
-          </p:cNvPr>
-          <p:cNvPicPr>
-            <a:picLocks noChangeAspect="1"/>
-          </p:cNvPicPr>
-          <p:nvPr/>
-        </p:nvPicPr>
-        <p:blipFill rotWithShape="1">
-          <a:blip r:embed="rId8">
-            <a:extLst>
-              <a:ext uri="{28A0092B-C50C-407E-A947-70E740481C1C}">
-                <a14:useLocalDpi xmlns:a14="http://schemas.microsoft.com/office/drawing/2010/main" val="0"/>
-              </a:ext>
-            </a:extLst>
-          </a:blip>
-          <a:srcRect l="7609" t="7681" r="22314" b="5095"/>
-          <a:stretch/>
-        </p:blipFill>
-        <p:spPr>
-          <a:xfrm>
-            <a:off x="25860374" y="360362"/>
-            <a:ext cx="4032807" cy="2509837"/>
-          </a:xfrm>
-          <a:prstGeom prst="rect">
-            <a:avLst/>
-          </a:prstGeom>
-        </p:spPr>
-      </p:pic>
       <p:sp>
         <p:nvSpPr>
           <p:cNvPr id="13329" name="ZoneTexte 80">
@@ -14728,6 +14693,53 @@
           </a:p>
         </p:txBody>
       </p:sp>
+      <p:pic>
+        <p:nvPicPr>
+          <p:cNvPr id="1026" name="Picture 2">
+            <a:extLst>
+              <a:ext uri="{FF2B5EF4-FFF2-40B4-BE49-F238E27FC236}">
+                <a16:creationId xmlns:a16="http://schemas.microsoft.com/office/drawing/2014/main" id="{9D219F05-71A2-4D69-98EA-CEC6B67A16BD}"/>
+              </a:ext>
+            </a:extLst>
+          </p:cNvPr>
+          <p:cNvPicPr>
+            <a:picLocks noChangeAspect="1" noChangeArrowheads="1"/>
+          </p:cNvPicPr>
+          <p:nvPr/>
+        </p:nvPicPr>
+        <p:blipFill>
+          <a:blip r:embed="rId8">
+            <a:extLst>
+              <a:ext uri="{28A0092B-C50C-407E-A947-70E740481C1C}">
+                <a14:useLocalDpi xmlns:a14="http://schemas.microsoft.com/office/drawing/2010/main" val="0"/>
+              </a:ext>
+            </a:extLst>
+          </a:blip>
+          <a:srcRect/>
+          <a:stretch>
+            <a:fillRect/>
+          </a:stretch>
+        </p:blipFill>
+        <p:spPr bwMode="auto">
+          <a:xfrm>
+            <a:off x="25730101" y="839787"/>
+            <a:ext cx="4431591" cy="1546225"/>
+          </a:xfrm>
+          <a:prstGeom prst="rect">
+            <a:avLst/>
+          </a:prstGeom>
+          <a:noFill/>
+          <a:extLst>
+            <a:ext uri="{909E8E84-426E-40DD-AFC4-6F175D3DCCD1}">
+              <a14:hiddenFill xmlns:a14="http://schemas.microsoft.com/office/drawing/2010/main">
+                <a:solidFill>
+                  <a:srgbClr val="FFFFFF"/>
+                </a:solidFill>
+              </a14:hiddenFill>
+            </a:ext>
+          </a:extLst>
+        </p:spPr>
+      </p:pic>
     </p:spTree>
   </p:cSld>
   <p:clrMapOvr>
@@ -37916,18 +37928,18 @@
 </file>
 
 <file path=customXml/item2.xml><?xml version="1.0" encoding="utf-8"?>
-<p:properties xmlns:p="http://schemas.microsoft.com/office/2006/metadata/properties" xmlns:xsi="http://www.w3.org/2001/XMLSchema-instance" xmlns:pc="http://schemas.microsoft.com/office/infopath/2007/PartnerControls">
-  <documentManagement/>
-</p:properties>
-</file>
-
-<file path=customXml/item3.xml><?xml version="1.0" encoding="utf-8"?>
 <?mso-contentType ?>
 <FormTemplates xmlns="http://schemas.microsoft.com/sharepoint/v3/contenttype/forms">
   <Display>DocumentLibraryForm</Display>
   <Edit>DocumentLibraryForm</Edit>
   <New>DocumentLibraryForm</New>
 </FormTemplates>
+</file>
+
+<file path=customXml/item3.xml><?xml version="1.0" encoding="utf-8"?>
+<p:properties xmlns:p="http://schemas.microsoft.com/office/2006/metadata/properties" xmlns:xsi="http://www.w3.org/2001/XMLSchema-instance" xmlns:pc="http://schemas.microsoft.com/office/infopath/2007/PartnerControls">
+  <documentManagement/>
+</p:properties>
 </file>
 
 <file path=customXml/itemProps1.xml><?xml version="1.0" encoding="utf-8"?>
@@ -37949,18 +37961,18 @@
 </file>
 
 <file path=customXml/itemProps2.xml><?xml version="1.0" encoding="utf-8"?>
+<ds:datastoreItem xmlns:ds="http://schemas.openxmlformats.org/officeDocument/2006/customXml" ds:itemID="{45611E4D-313B-4730-870C-A665CCEAEF8D}">
+  <ds:schemaRefs>
+    <ds:schemaRef ds:uri="http://schemas.microsoft.com/sharepoint/v3/contenttype/forms"/>
+  </ds:schemaRefs>
+</ds:datastoreItem>
+</file>
+
+<file path=customXml/itemProps3.xml><?xml version="1.0" encoding="utf-8"?>
 <ds:datastoreItem xmlns:ds="http://schemas.openxmlformats.org/officeDocument/2006/customXml" ds:itemID="{F6253564-48AC-4848-98BD-7E6C38EE265E}">
   <ds:schemaRefs>
     <ds:schemaRef ds:uri="http://schemas.microsoft.com/office/2006/metadata/properties"/>
     <ds:schemaRef ds:uri="http://schemas.microsoft.com/office/infopath/2007/PartnerControls"/>
   </ds:schemaRefs>
 </ds:datastoreItem>
-</file>
-
-<file path=customXml/itemProps3.xml><?xml version="1.0" encoding="utf-8"?>
-<ds:datastoreItem xmlns:ds="http://schemas.openxmlformats.org/officeDocument/2006/customXml" ds:itemID="{45611E4D-313B-4730-870C-A665CCEAEF8D}">
-  <ds:schemaRefs>
-    <ds:schemaRef ds:uri="http://schemas.microsoft.com/sharepoint/v3/contenttype/forms"/>
-  </ds:schemaRefs>
-</ds:datastoreItem>
 </file>
</xml_diff>